<commit_message>
minor update to quid documents
</commit_message>
<xml_diff>
--- a/SWEN3000/Documents/Presentation.pptx
+++ b/SWEN3000/Documents/Presentation.pptx
@@ -849,7 +849,7 @@
             <a:fld id="{B61BEF0D-F0BB-DE4B-95CE-6DB70DBA9567}" type="datetimeFigureOut">
               <a:rPr lang="en-US" dirty="0"/>
               <a:pPr/>
-              <a:t>6/1/2019</a:t>
+              <a:t>6/2/19</a:t>
             </a:fld>
             <a:endParaRPr lang="en-US" dirty="0"/>
           </a:p>
@@ -1097,7 +1097,7 @@
             <a:fld id="{B61BEF0D-F0BB-DE4B-95CE-6DB70DBA9567}" type="datetimeFigureOut">
               <a:rPr lang="en-US" dirty="0"/>
               <a:pPr/>
-              <a:t>6/1/2019</a:t>
+              <a:t>6/2/19</a:t>
             </a:fld>
             <a:endParaRPr lang="en-US" dirty="0"/>
           </a:p>
@@ -1408,7 +1408,7 @@
             <a:fld id="{B61BEF0D-F0BB-DE4B-95CE-6DB70DBA9567}" type="datetimeFigureOut">
               <a:rPr lang="en-US" dirty="0"/>
               <a:pPr/>
-              <a:t>6/1/2019</a:t>
+              <a:t>6/2/19</a:t>
             </a:fld>
             <a:endParaRPr lang="en-US" dirty="0"/>
           </a:p>
@@ -1732,7 +1732,7 @@
             <a:fld id="{B61BEF0D-F0BB-DE4B-95CE-6DB70DBA9567}" type="datetimeFigureOut">
               <a:rPr lang="en-US" dirty="0"/>
               <a:pPr/>
-              <a:t>6/1/2019</a:t>
+              <a:t>6/2/19</a:t>
             </a:fld>
             <a:endParaRPr lang="en-US" dirty="0"/>
           </a:p>
@@ -2043,7 +2043,7 @@
             <a:fld id="{B61BEF0D-F0BB-DE4B-95CE-6DB70DBA9567}" type="datetimeFigureOut">
               <a:rPr lang="en-US" dirty="0"/>
               <a:pPr/>
-              <a:t>6/1/2019</a:t>
+              <a:t>6/2/19</a:t>
             </a:fld>
             <a:endParaRPr lang="en-US" dirty="0"/>
           </a:p>
@@ -2427,7 +2427,7 @@
             <a:fld id="{B61BEF0D-F0BB-DE4B-95CE-6DB70DBA9567}" type="datetimeFigureOut">
               <a:rPr lang="en-US" dirty="0"/>
               <a:pPr/>
-              <a:t>6/1/2019</a:t>
+              <a:t>6/2/19</a:t>
             </a:fld>
             <a:endParaRPr lang="en-US" dirty="0"/>
           </a:p>
@@ -2593,7 +2593,7 @@
           <a:p>
             <a:fld id="{55C6B4A9-1611-4792-9094-5F34BCA07E0B}" type="datetimeFigureOut">
               <a:rPr lang="en-US" dirty="0"/>
-              <a:t>6/1/2019</a:t>
+              <a:t>6/2/19</a:t>
             </a:fld>
             <a:endParaRPr lang="en-US" dirty="0"/>
           </a:p>
@@ -2769,7 +2769,7 @@
             <a:fld id="{B61BEF0D-F0BB-DE4B-95CE-6DB70DBA9567}" type="datetimeFigureOut">
               <a:rPr lang="en-US" dirty="0"/>
               <a:pPr/>
-              <a:t>6/1/2019</a:t>
+              <a:t>6/2/19</a:t>
             </a:fld>
             <a:endParaRPr lang="en-US" dirty="0"/>
           </a:p>
@@ -2942,7 +2942,7 @@
             <a:fld id="{B61BEF0D-F0BB-DE4B-95CE-6DB70DBA9567}" type="datetimeFigureOut">
               <a:rPr lang="en-US" dirty="0"/>
               <a:pPr/>
-              <a:t>6/1/2019</a:t>
+              <a:t>6/2/19</a:t>
             </a:fld>
             <a:endParaRPr lang="en-US" dirty="0"/>
           </a:p>
@@ -3186,7 +3186,7 @@
             <a:fld id="{B61BEF0D-F0BB-DE4B-95CE-6DB70DBA9567}" type="datetimeFigureOut">
               <a:rPr lang="en-US" dirty="0"/>
               <a:pPr/>
-              <a:t>6/1/2019</a:t>
+              <a:t>6/2/19</a:t>
             </a:fld>
             <a:endParaRPr lang="en-US" dirty="0"/>
           </a:p>
@@ -3414,7 +3414,7 @@
           <a:p>
             <a:fld id="{EB712588-04B1-427B-82EE-E8DB90309F08}" type="datetimeFigureOut">
               <a:rPr lang="en-US" dirty="0"/>
-              <a:t>6/1/2019</a:t>
+              <a:t>6/2/19</a:t>
             </a:fld>
             <a:endParaRPr lang="en-US" dirty="0"/>
           </a:p>
@@ -3784,7 +3784,7 @@
             <a:fld id="{B61BEF0D-F0BB-DE4B-95CE-6DB70DBA9567}" type="datetimeFigureOut">
               <a:rPr lang="en-US" dirty="0"/>
               <a:pPr/>
-              <a:t>6/1/2019</a:t>
+              <a:t>6/2/19</a:t>
             </a:fld>
             <a:endParaRPr lang="en-US" dirty="0"/>
           </a:p>
@@ -3904,7 +3904,7 @@
             <a:fld id="{B61BEF0D-F0BB-DE4B-95CE-6DB70DBA9567}" type="datetimeFigureOut">
               <a:rPr lang="en-US" dirty="0"/>
               <a:pPr/>
-              <a:t>6/1/2019</a:t>
+              <a:t>6/2/19</a:t>
             </a:fld>
             <a:endParaRPr lang="en-US" dirty="0"/>
           </a:p>
@@ -3996,7 +3996,7 @@
             <a:fld id="{B61BEF0D-F0BB-DE4B-95CE-6DB70DBA9567}" type="datetimeFigureOut">
               <a:rPr lang="en-US" dirty="0"/>
               <a:pPr/>
-              <a:t>6/1/2019</a:t>
+              <a:t>6/2/19</a:t>
             </a:fld>
             <a:endParaRPr lang="en-US" dirty="0"/>
           </a:p>
@@ -4247,7 +4247,7 @@
           <a:p>
             <a:fld id="{42A54C80-263E-416B-A8E0-580EDEADCBDC}" type="datetimeFigureOut">
               <a:rPr lang="en-US" dirty="0"/>
-              <a:t>6/1/2019</a:t>
+              <a:t>6/2/19</a:t>
             </a:fld>
             <a:endParaRPr lang="en-US" dirty="0"/>
           </a:p>
@@ -4506,7 +4506,7 @@
             <a:fld id="{B61BEF0D-F0BB-DE4B-95CE-6DB70DBA9567}" type="datetimeFigureOut">
               <a:rPr lang="en-US" dirty="0"/>
               <a:pPr/>
-              <a:t>6/1/2019</a:t>
+              <a:t>6/2/19</a:t>
             </a:fld>
             <a:endParaRPr lang="en-US" dirty="0"/>
           </a:p>
@@ -5248,7 +5248,7 @@
             <a:fld id="{B61BEF0D-F0BB-DE4B-95CE-6DB70DBA9567}" type="datetimeFigureOut">
               <a:rPr lang="en-US" dirty="0"/>
               <a:pPr/>
-              <a:t>6/1/2019</a:t>
+              <a:t>6/2/19</a:t>
             </a:fld>
             <a:endParaRPr lang="en-US" dirty="0"/>
           </a:p>
@@ -8300,10 +8300,10 @@
       </p:sp>
       <p:pic>
         <p:nvPicPr>
-          <p:cNvPr id="3" name="Picture 2">
+          <p:cNvPr id="4" name="Picture 3">
             <a:extLst>
               <a:ext uri="{FF2B5EF4-FFF2-40B4-BE49-F238E27FC236}">
-                <a16:creationId xmlns:a16="http://schemas.microsoft.com/office/drawing/2014/main" id="{AC7F5AFF-BDF2-4B4B-B4E5-ED30D80FFC82}"/>
+                <a16:creationId xmlns:a16="http://schemas.microsoft.com/office/drawing/2014/main" id="{EB2BEA75-5869-1842-B454-1BA0F978FF86}"/>
               </a:ext>
             </a:extLst>
           </p:cNvPr>
@@ -8320,8 +8320,8 @@
         </p:blipFill>
         <p:spPr>
           <a:xfrm>
-            <a:off x="4874075" y="2137937"/>
-            <a:ext cx="6482039" cy="3544866"/>
+            <a:off x="1293106" y="1788930"/>
+            <a:ext cx="2487889" cy="4422913"/>
           </a:xfrm>
           <a:prstGeom prst="rect">
             <a:avLst/>
@@ -8330,10 +8330,10 @@
       </p:pic>
       <p:pic>
         <p:nvPicPr>
-          <p:cNvPr id="6" name="Picture 5">
+          <p:cNvPr id="9" name="Picture 8">
             <a:extLst>
               <a:ext uri="{FF2B5EF4-FFF2-40B4-BE49-F238E27FC236}">
-                <a16:creationId xmlns:a16="http://schemas.microsoft.com/office/drawing/2014/main" id="{19D3879E-2BBA-454D-8488-911AD1248822}"/>
+                <a16:creationId xmlns:a16="http://schemas.microsoft.com/office/drawing/2014/main" id="{62AF23B2-8389-8540-AF70-7770EFD30A13}"/>
               </a:ext>
             </a:extLst>
           </p:cNvPr>
@@ -8350,8 +8350,8 @@
         </p:blipFill>
         <p:spPr>
           <a:xfrm>
-            <a:off x="835886" y="1671638"/>
-            <a:ext cx="2669468" cy="4745721"/>
+            <a:off x="5415719" y="1788930"/>
+            <a:ext cx="5120195" cy="4560846"/>
           </a:xfrm>
           <a:prstGeom prst="rect">
             <a:avLst/>

</xml_diff>